<commit_message>
Modificación de fechas en presentaciones.
</commit_message>
<xml_diff>
--- a/Semana4/ModosProcesador.pptx
+++ b/Semana4/ModosProcesador.pptx
@@ -3459,8 +3459,12 @@
           <a:lstStyle/>
           <a:p>
             <a:r>
-              <a:rPr lang="es-MX" dirty="0" smtClean="0"/>
-              <a:t>Febrero 2012</a:t>
+              <a:rPr lang="es-MX" smtClean="0"/>
+              <a:t>Febrero </a:t>
+            </a:r>
+            <a:r>
+              <a:rPr lang="es-MX" smtClean="0"/>
+              <a:t>2013</a:t>
             </a:r>
             <a:endParaRPr lang="es-MX" dirty="0"/>
           </a:p>

</xml_diff>